<commit_message>
Actualizacion de las diapositivas
</commit_message>
<xml_diff>
--- a/Fase 1/Evidencias Grupales/Presentación Capstone.pptx
+++ b/Fase 1/Evidencias Grupales/Presentación Capstone.pptx
@@ -13,6 +13,8 @@
     <p:sldId id="258" r:id="rId10"/>
     <p:sldId id="262" r:id="rId11"/>
     <p:sldId id="263" r:id="rId12"/>
+    <p:sldId id="264" r:id="rId13"/>
+    <p:sldId id="265" r:id="rId14"/>
   </p:sldIdLst>
   <p:sldSz cx="12192000" cy="6858000"/>
   <p:notesSz cx="6858000" cy="9144000"/>
@@ -349,7 +351,7 @@
             <a:fld id="{B61BEF0D-F0BB-DE4B-95CE-6DB70DBA9567}" type="datetimeFigureOut">
               <a:rPr lang="en-US" dirty="0"/>
               <a:pPr/>
-              <a:t>8/31/2024</a:t>
+              <a:t>9/1/2024</a:t>
             </a:fld>
             <a:endParaRPr lang="en-US" dirty="0"/>
           </a:p>
@@ -680,7 +682,7 @@
             <a:fld id="{B61BEF0D-F0BB-DE4B-95CE-6DB70DBA9567}" type="datetimeFigureOut">
               <a:rPr lang="en-US" dirty="0"/>
               <a:pPr/>
-              <a:t>8/31/2024</a:t>
+              <a:t>9/1/2024</a:t>
             </a:fld>
             <a:endParaRPr lang="en-US" dirty="0"/>
           </a:p>
@@ -955,7 +957,7 @@
             <a:fld id="{B61BEF0D-F0BB-DE4B-95CE-6DB70DBA9567}" type="datetimeFigureOut">
               <a:rPr lang="en-US" dirty="0"/>
               <a:pPr/>
-              <a:t>8/31/2024</a:t>
+              <a:t>9/1/2024</a:t>
             </a:fld>
             <a:endParaRPr lang="en-US" dirty="0"/>
           </a:p>
@@ -1520,7 +1522,7 @@
             <a:fld id="{B61BEF0D-F0BB-DE4B-95CE-6DB70DBA9567}" type="datetimeFigureOut">
               <a:rPr lang="en-US" dirty="0"/>
               <a:pPr/>
-              <a:t>8/31/2024</a:t>
+              <a:t>9/1/2024</a:t>
             </a:fld>
             <a:endParaRPr lang="en-US" dirty="0"/>
           </a:p>
@@ -1795,7 +1797,7 @@
             <a:fld id="{B61BEF0D-F0BB-DE4B-95CE-6DB70DBA9567}" type="datetimeFigureOut">
               <a:rPr lang="en-US" dirty="0"/>
               <a:pPr/>
-              <a:t>8/31/2024</a:t>
+              <a:t>9/1/2024</a:t>
             </a:fld>
             <a:endParaRPr lang="en-US" dirty="0"/>
           </a:p>
@@ -2354,7 +2356,7 @@
             <a:fld id="{B61BEF0D-F0BB-DE4B-95CE-6DB70DBA9567}" type="datetimeFigureOut">
               <a:rPr lang="en-US" dirty="0"/>
               <a:pPr/>
-              <a:t>8/31/2024</a:t>
+              <a:t>9/1/2024</a:t>
             </a:fld>
             <a:endParaRPr lang="en-US" dirty="0"/>
           </a:p>
@@ -2678,7 +2680,7 @@
             <a:fld id="{B61BEF0D-F0BB-DE4B-95CE-6DB70DBA9567}" type="datetimeFigureOut">
               <a:rPr lang="en-US" dirty="0"/>
               <a:pPr/>
-              <a:t>8/31/2024</a:t>
+              <a:t>9/1/2024</a:t>
             </a:fld>
             <a:endParaRPr lang="en-US" dirty="0"/>
           </a:p>
@@ -2852,7 +2854,7 @@
             <a:fld id="{B61BEF0D-F0BB-DE4B-95CE-6DB70DBA9567}" type="datetimeFigureOut">
               <a:rPr lang="en-US" dirty="0"/>
               <a:pPr/>
-              <a:t>8/31/2024</a:t>
+              <a:t>9/1/2024</a:t>
             </a:fld>
             <a:endParaRPr lang="en-US" dirty="0"/>
           </a:p>
@@ -3087,7 +3089,7 @@
             <a:fld id="{B61BEF0D-F0BB-DE4B-95CE-6DB70DBA9567}" type="datetimeFigureOut">
               <a:rPr lang="en-US" dirty="0"/>
               <a:pPr/>
-              <a:t>8/31/2024</a:t>
+              <a:t>9/1/2024</a:t>
             </a:fld>
             <a:endParaRPr lang="en-US" dirty="0"/>
           </a:p>
@@ -3284,7 +3286,7 @@
             <a:fld id="{B61BEF0D-F0BB-DE4B-95CE-6DB70DBA9567}" type="datetimeFigureOut">
               <a:rPr lang="en-US" dirty="0"/>
               <a:pPr/>
-              <a:t>8/31/2024</a:t>
+              <a:t>9/1/2024</a:t>
             </a:fld>
             <a:endParaRPr lang="en-US" dirty="0"/>
           </a:p>
@@ -3557,7 +3559,7 @@
             <a:fld id="{B61BEF0D-F0BB-DE4B-95CE-6DB70DBA9567}" type="datetimeFigureOut">
               <a:rPr lang="en-US" dirty="0"/>
               <a:pPr/>
-              <a:t>8/31/2024</a:t>
+              <a:t>9/1/2024</a:t>
             </a:fld>
             <a:endParaRPr lang="en-US" dirty="0"/>
           </a:p>
@@ -3820,7 +3822,7 @@
             <a:fld id="{B61BEF0D-F0BB-DE4B-95CE-6DB70DBA9567}" type="datetimeFigureOut">
               <a:rPr lang="en-US" dirty="0"/>
               <a:pPr/>
-              <a:t>8/31/2024</a:t>
+              <a:t>9/1/2024</a:t>
             </a:fld>
             <a:endParaRPr lang="en-US" dirty="0"/>
           </a:p>
@@ -4191,7 +4193,7 @@
             <a:fld id="{B61BEF0D-F0BB-DE4B-95CE-6DB70DBA9567}" type="datetimeFigureOut">
               <a:rPr lang="en-US" dirty="0"/>
               <a:pPr/>
-              <a:t>8/31/2024</a:t>
+              <a:t>9/1/2024</a:t>
             </a:fld>
             <a:endParaRPr lang="en-US" dirty="0"/>
           </a:p>
@@ -4336,7 +4338,7 @@
             <a:fld id="{B61BEF0D-F0BB-DE4B-95CE-6DB70DBA9567}" type="datetimeFigureOut">
               <a:rPr lang="en-US" dirty="0"/>
               <a:pPr/>
-              <a:t>8/31/2024</a:t>
+              <a:t>9/1/2024</a:t>
             </a:fld>
             <a:endParaRPr lang="en-US" dirty="0"/>
           </a:p>
@@ -4458,7 +4460,7 @@
             <a:fld id="{B61BEF0D-F0BB-DE4B-95CE-6DB70DBA9567}" type="datetimeFigureOut">
               <a:rPr lang="en-US" dirty="0"/>
               <a:pPr/>
-              <a:t>8/31/2024</a:t>
+              <a:t>9/1/2024</a:t>
             </a:fld>
             <a:endParaRPr lang="en-US" dirty="0"/>
           </a:p>
@@ -4740,7 +4742,7 @@
             <a:fld id="{B61BEF0D-F0BB-DE4B-95CE-6DB70DBA9567}" type="datetimeFigureOut">
               <a:rPr lang="en-US" dirty="0"/>
               <a:pPr/>
-              <a:t>8/31/2024</a:t>
+              <a:t>9/1/2024</a:t>
             </a:fld>
             <a:endParaRPr lang="en-US" dirty="0"/>
           </a:p>
@@ -5061,7 +5063,7 @@
             <a:fld id="{B61BEF0D-F0BB-DE4B-95CE-6DB70DBA9567}" type="datetimeFigureOut">
               <a:rPr lang="en-US" dirty="0"/>
               <a:pPr/>
-              <a:t>8/31/2024</a:t>
+              <a:t>9/1/2024</a:t>
             </a:fld>
             <a:endParaRPr lang="en-US" dirty="0"/>
           </a:p>
@@ -5272,7 +5274,7 @@
             <a:fld id="{B61BEF0D-F0BB-DE4B-95CE-6DB70DBA9567}" type="datetimeFigureOut">
               <a:rPr lang="en-US" dirty="0"/>
               <a:pPr/>
-              <a:t>8/31/2024</a:t>
+              <a:t>9/1/2024</a:t>
             </a:fld>
             <a:endParaRPr lang="en-US" dirty="0"/>
           </a:p>
@@ -5881,6 +5883,68 @@
 </p:sld>
 </file>
 
+<file path=ppt/slides/slide10.xml><?xml version="1.0" encoding="utf-8"?>
+<p:sld xmlns:a="http://schemas.openxmlformats.org/drawingml/2006/main" xmlns:r="http://schemas.openxmlformats.org/officeDocument/2006/relationships" xmlns:p="http://schemas.openxmlformats.org/presentationml/2006/main">
+  <p:cSld>
+    <p:spTree>
+      <p:nvGrpSpPr>
+        <p:cNvPr id="1" name=""/>
+        <p:cNvGrpSpPr/>
+        <p:nvPr/>
+      </p:nvGrpSpPr>
+      <p:grpSpPr>
+        <a:xfrm>
+          <a:off x="0" y="0"/>
+          <a:ext cx="0" cy="0"/>
+          <a:chOff x="0" y="0"/>
+          <a:chExt cx="0" cy="0"/>
+        </a:xfrm>
+      </p:grpSpPr>
+      <p:sp>
+        <p:nvSpPr>
+          <p:cNvPr id="2" name="Título 1">
+            <a:extLst>
+              <a:ext uri="{FF2B5EF4-FFF2-40B4-BE49-F238E27FC236}">
+                <a16:creationId xmlns:a16="http://schemas.microsoft.com/office/drawing/2014/main" id="{42CAE5DF-6027-0C4F-1839-10E52B7CECAE}"/>
+              </a:ext>
+            </a:extLst>
+          </p:cNvPr>
+          <p:cNvSpPr>
+            <a:spLocks noGrp="1"/>
+          </p:cNvSpPr>
+          <p:nvPr>
+            <p:ph type="title"/>
+          </p:nvPr>
+        </p:nvSpPr>
+        <p:spPr/>
+        <p:txBody>
+          <a:bodyPr/>
+          <a:lstStyle/>
+          <a:p>
+            <a:r>
+              <a:rPr lang="en-US" b="1" dirty="0"/>
+              <a:t>Product</a:t>
+            </a:r>
+            <a:r>
+              <a:rPr lang="es-CL" b="1" dirty="0"/>
+              <a:t> backlog</a:t>
+            </a:r>
+          </a:p>
+        </p:txBody>
+      </p:sp>
+    </p:spTree>
+    <p:extLst>
+      <p:ext uri="{BB962C8B-B14F-4D97-AF65-F5344CB8AC3E}">
+        <p14:creationId xmlns:p14="http://schemas.microsoft.com/office/powerpoint/2010/main" val="2896381880"/>
+      </p:ext>
+    </p:extLst>
+  </p:cSld>
+  <p:clrMapOvr>
+    <a:masterClrMapping/>
+  </p:clrMapOvr>
+</p:sld>
+</file>
+
 <file path=ppt/slides/slide2.xml><?xml version="1.0" encoding="utf-8"?>
 <p:sld xmlns:a="http://schemas.openxmlformats.org/drawingml/2006/main" xmlns:r="http://schemas.openxmlformats.org/officeDocument/2006/relationships" xmlns:p="http://schemas.openxmlformats.org/presentationml/2006/main">
   <p:cSld>
@@ -5940,8 +6004,8 @@
         </p:nvSpPr>
         <p:spPr>
           <a:xfrm>
-            <a:off x="914401" y="2065867"/>
-            <a:ext cx="3026664" cy="3970318"/>
+            <a:off x="685801" y="1809835"/>
+            <a:ext cx="3026664" cy="5262979"/>
           </a:xfrm>
           <a:prstGeom prst="rect">
             <a:avLst/>
@@ -5959,7 +6023,7 @@
               <a:buChar char="v"/>
             </a:pPr>
             <a:r>
-              <a:rPr lang="es-CL" dirty="0"/>
+              <a:rPr lang="es-CL" sz="2400" dirty="0"/>
               <a:t>Contexto</a:t>
             </a:r>
           </a:p>
@@ -5968,7 +6032,7 @@
               <a:buFont typeface="Wingdings" panose="05000000000000000000" pitchFamily="2" charset="2"/>
               <a:buChar char="v"/>
             </a:pPr>
-            <a:endParaRPr lang="es-CL" dirty="0"/>
+            <a:endParaRPr lang="es-CL" sz="2400" dirty="0"/>
           </a:p>
           <a:p>
             <a:pPr marL="285750" indent="-285750">
@@ -5976,7 +6040,7 @@
               <a:buChar char="v"/>
             </a:pPr>
             <a:r>
-              <a:rPr lang="es-CL" dirty="0"/>
+              <a:rPr lang="es-CL" sz="2400" dirty="0"/>
               <a:t>Problema </a:t>
             </a:r>
           </a:p>
@@ -5985,7 +6049,7 @@
               <a:buFont typeface="Wingdings" panose="05000000000000000000" pitchFamily="2" charset="2"/>
               <a:buChar char="v"/>
             </a:pPr>
-            <a:endParaRPr lang="es-CL" dirty="0"/>
+            <a:endParaRPr lang="es-CL" sz="2400" dirty="0"/>
           </a:p>
           <a:p>
             <a:pPr marL="285750" indent="-285750">
@@ -5993,7 +6057,7 @@
               <a:buChar char="v"/>
             </a:pPr>
             <a:r>
-              <a:rPr lang="es-CL" dirty="0"/>
+              <a:rPr lang="es-CL" sz="2400" dirty="0"/>
               <a:t>Solución</a:t>
             </a:r>
           </a:p>
@@ -6002,7 +6066,7 @@
               <a:buFont typeface="Wingdings" panose="05000000000000000000" pitchFamily="2" charset="2"/>
               <a:buChar char="v"/>
             </a:pPr>
-            <a:endParaRPr lang="es-CL" dirty="0"/>
+            <a:endParaRPr lang="es-CL" sz="2400" dirty="0"/>
           </a:p>
           <a:p>
             <a:pPr marL="285750" indent="-285750">
@@ -6010,7 +6074,7 @@
               <a:buChar char="v"/>
             </a:pPr>
             <a:r>
-              <a:rPr lang="es-CL" dirty="0"/>
+              <a:rPr lang="es-CL" sz="2400" dirty="0"/>
               <a:t>Arquitectura</a:t>
             </a:r>
           </a:p>
@@ -6019,7 +6083,7 @@
               <a:buFont typeface="Wingdings" panose="05000000000000000000" pitchFamily="2" charset="2"/>
               <a:buChar char="v"/>
             </a:pPr>
-            <a:endParaRPr lang="es-CL" dirty="0"/>
+            <a:endParaRPr lang="es-CL" sz="2400" dirty="0"/>
           </a:p>
           <a:p>
             <a:pPr marL="285750" indent="-285750">
@@ -6027,7 +6091,7 @@
               <a:buChar char="v"/>
             </a:pPr>
             <a:r>
-              <a:rPr lang="es-CL" dirty="0"/>
+              <a:rPr lang="es-CL" sz="2400" dirty="0"/>
               <a:t>Metodología</a:t>
             </a:r>
           </a:p>
@@ -6036,7 +6100,7 @@
               <a:buFont typeface="Wingdings" panose="05000000000000000000" pitchFamily="2" charset="2"/>
               <a:buChar char="v"/>
             </a:pPr>
-            <a:endParaRPr lang="es-CL" dirty="0"/>
+            <a:endParaRPr lang="es-CL" sz="2400" dirty="0"/>
           </a:p>
           <a:p>
             <a:pPr marL="285750" indent="-285750">
@@ -6044,7 +6108,7 @@
               <a:buChar char="v"/>
             </a:pPr>
             <a:r>
-              <a:rPr lang="es-CL" dirty="0"/>
+              <a:rPr lang="es-CL" sz="2400" dirty="0"/>
               <a:t>Roles</a:t>
             </a:r>
           </a:p>
@@ -6053,7 +6117,7 @@
               <a:buFont typeface="Wingdings" panose="05000000000000000000" pitchFamily="2" charset="2"/>
               <a:buChar char="v"/>
             </a:pPr>
-            <a:endParaRPr lang="es-CL" dirty="0"/>
+            <a:endParaRPr lang="es-CL" sz="2400" dirty="0"/>
           </a:p>
           <a:p>
             <a:pPr marL="285750" indent="-285750">
@@ -6061,7 +6125,7 @@
               <a:buChar char="v"/>
             </a:pPr>
             <a:r>
-              <a:rPr lang="es-CL" dirty="0"/>
+              <a:rPr lang="es-CL" sz="2400" dirty="0"/>
               <a:t>Evidencias</a:t>
             </a:r>
           </a:p>
@@ -6070,7 +6134,7 @@
               <a:buFont typeface="Wingdings" panose="05000000000000000000" pitchFamily="2" charset="2"/>
               <a:buChar char="v"/>
             </a:pPr>
-            <a:endParaRPr lang="es-CL" dirty="0"/>
+            <a:endParaRPr lang="es-CL" sz="2400" dirty="0"/>
           </a:p>
         </p:txBody>
       </p:sp>
@@ -6088,8 +6152,8 @@
         </p:nvSpPr>
         <p:spPr>
           <a:xfrm>
-            <a:off x="6214873" y="2065867"/>
-            <a:ext cx="3026664" cy="2031325"/>
+            <a:off x="4687825" y="1809835"/>
+            <a:ext cx="3026664" cy="2677656"/>
           </a:xfrm>
           <a:prstGeom prst="rect">
             <a:avLst/>
@@ -6107,7 +6171,7 @@
               <a:buChar char="v"/>
             </a:pPr>
             <a:r>
-              <a:rPr lang="es-CL" dirty="0"/>
+              <a:rPr lang="es-CL" sz="2400" dirty="0"/>
               <a:t>Product Backlog</a:t>
             </a:r>
           </a:p>
@@ -6116,7 +6180,7 @@
               <a:buFont typeface="Wingdings" panose="05000000000000000000" pitchFamily="2" charset="2"/>
               <a:buChar char="v"/>
             </a:pPr>
-            <a:endParaRPr lang="es-CL" dirty="0"/>
+            <a:endParaRPr lang="es-CL" sz="2400" dirty="0"/>
           </a:p>
           <a:p>
             <a:pPr marL="285750" indent="-285750">
@@ -6124,7 +6188,7 @@
               <a:buChar char="v"/>
             </a:pPr>
             <a:r>
-              <a:rPr lang="es-CL" dirty="0"/>
+              <a:rPr lang="es-CL" sz="2400" dirty="0"/>
               <a:t>Carta Gantt</a:t>
             </a:r>
           </a:p>
@@ -6133,7 +6197,7 @@
               <a:buFont typeface="Wingdings" panose="05000000000000000000" pitchFamily="2" charset="2"/>
               <a:buChar char="v"/>
             </a:pPr>
-            <a:endParaRPr lang="es-CL" dirty="0"/>
+            <a:endParaRPr lang="es-CL" sz="2400" dirty="0"/>
           </a:p>
           <a:p>
             <a:pPr marL="285750" indent="-285750">
@@ -6141,7 +6205,7 @@
               <a:buChar char="v"/>
             </a:pPr>
             <a:r>
-              <a:rPr lang="es-CL" dirty="0"/>
+              <a:rPr lang="es-CL" sz="2400" dirty="0"/>
               <a:t>Sprint</a:t>
             </a:r>
           </a:p>
@@ -6150,7 +6214,7 @@
               <a:buFont typeface="Wingdings" panose="05000000000000000000" pitchFamily="2" charset="2"/>
               <a:buChar char="v"/>
             </a:pPr>
-            <a:endParaRPr lang="es-CL" dirty="0"/>
+            <a:endParaRPr lang="es-CL" sz="2400" dirty="0"/>
           </a:p>
           <a:p>
             <a:pPr marL="285750" indent="-285750">
@@ -6158,7 +6222,7 @@
               <a:buChar char="v"/>
             </a:pPr>
             <a:r>
-              <a:rPr lang="es-CL" dirty="0"/>
+              <a:rPr lang="es-CL" sz="2400" dirty="0"/>
               <a:t>Conclusión</a:t>
             </a:r>
           </a:p>
@@ -7014,8 +7078,8 @@
         </p:nvSpPr>
         <p:spPr>
           <a:xfrm>
-            <a:off x="1125199" y="177839"/>
-            <a:ext cx="10127192" cy="931340"/>
+            <a:off x="4746837" y="143550"/>
+            <a:ext cx="2430632" cy="743418"/>
           </a:xfrm>
         </p:spPr>
         <p:txBody>
@@ -7060,7 +7124,7 @@
         </p:blipFill>
         <p:spPr bwMode="auto">
           <a:xfrm>
-            <a:off x="922867" y="1287018"/>
+            <a:off x="621115" y="972943"/>
             <a:ext cx="2455164" cy="2455164"/>
           </a:xfrm>
           <a:prstGeom prst="roundRect">
@@ -7134,7 +7198,7 @@
         </p:blipFill>
         <p:spPr bwMode="auto">
           <a:xfrm>
-            <a:off x="3555831" y="1287018"/>
+            <a:off x="645478" y="4133088"/>
             <a:ext cx="2455164" cy="2455164"/>
           </a:xfrm>
           <a:prstGeom prst="roundRect">
@@ -7208,7 +7272,7 @@
         </p:blipFill>
         <p:spPr bwMode="auto">
           <a:xfrm>
-            <a:off x="6188795" y="1287018"/>
+            <a:off x="8815747" y="4133088"/>
             <a:ext cx="2455164" cy="2455164"/>
           </a:xfrm>
           <a:prstGeom prst="roundRect">
@@ -7282,7 +7346,7 @@
         </p:blipFill>
         <p:spPr bwMode="auto">
           <a:xfrm>
-            <a:off x="8815747" y="1287018"/>
+            <a:off x="8815747" y="972943"/>
             <a:ext cx="2455164" cy="2455164"/>
           </a:xfrm>
           <a:prstGeom prst="roundRect">
@@ -7342,8 +7406,8 @@
         </p:nvSpPr>
         <p:spPr>
           <a:xfrm>
-            <a:off x="1060704" y="4142232"/>
-            <a:ext cx="2212848" cy="923330"/>
+            <a:off x="3374136" y="1877359"/>
+            <a:ext cx="2212848" cy="646331"/>
           </a:xfrm>
           <a:prstGeom prst="rect">
             <a:avLst/>
@@ -7358,25 +7422,9 @@
           <a:p>
             <a:pPr algn="ctr"/>
             <a:r>
-              <a:rPr lang="es-CL" dirty="0" err="1"/>
-              <a:t>Product</a:t>
-            </a:r>
-            <a:r>
-              <a:rPr lang="es-CL" dirty="0"/>
-              <a:t> </a:t>
-            </a:r>
-            <a:r>
-              <a:rPr lang="es-CL" dirty="0" err="1"/>
-              <a:t>Owner</a:t>
-            </a:r>
-            <a:r>
-              <a:rPr lang="es-CL" dirty="0"/>
-              <a:t> </a:t>
-            </a:r>
-          </a:p>
-          <a:p>
-            <a:pPr algn="ctr"/>
-            <a:endParaRPr lang="es-CL" dirty="0"/>
+              <a:rPr lang="en-US" dirty="0"/>
+              <a:t>Product Owner </a:t>
+            </a:r>
           </a:p>
           <a:p>
             <a:pPr algn="ctr"/>
@@ -7401,8 +7449,8 @@
         </p:nvSpPr>
         <p:spPr>
           <a:xfrm>
-            <a:off x="3646869" y="4142232"/>
-            <a:ext cx="2212848" cy="1200329"/>
+            <a:off x="3610039" y="4899005"/>
+            <a:ext cx="2212848" cy="923330"/>
           </a:xfrm>
           <a:prstGeom prst="rect">
             <a:avLst/>
@@ -7421,22 +7469,9 @@
               <a:t>Scrum Master | </a:t>
             </a:r>
             <a:r>
-              <a:rPr lang="es-CL" dirty="0" err="1"/>
-              <a:t>Development</a:t>
-            </a:r>
-            <a:r>
-              <a:rPr lang="es-CL" dirty="0"/>
-              <a:t> </a:t>
-            </a:r>
-            <a:r>
-              <a:rPr lang="es-CL" dirty="0" err="1"/>
-              <a:t>Team</a:t>
-            </a:r>
-            <a:endParaRPr lang="es-CL" dirty="0"/>
-          </a:p>
-          <a:p>
-            <a:pPr algn="ctr"/>
-            <a:endParaRPr lang="es-CL" dirty="0"/>
+              <a:rPr lang="en-US" dirty="0"/>
+              <a:t>Development Team</a:t>
+            </a:r>
           </a:p>
           <a:p>
             <a:pPr algn="ctr"/>
@@ -7461,8 +7496,8 @@
         </p:nvSpPr>
         <p:spPr>
           <a:xfrm>
-            <a:off x="6332284" y="4142232"/>
-            <a:ext cx="2212848" cy="923330"/>
+            <a:off x="6378004" y="1877358"/>
+            <a:ext cx="2212848" cy="646331"/>
           </a:xfrm>
           <a:prstGeom prst="rect">
             <a:avLst/>
@@ -7477,22 +7512,9 @@
           <a:p>
             <a:pPr algn="ctr"/>
             <a:r>
-              <a:rPr lang="es-CL" dirty="0" err="1"/>
-              <a:t>Development</a:t>
-            </a:r>
-            <a:r>
-              <a:rPr lang="es-CL" dirty="0"/>
-              <a:t> </a:t>
-            </a:r>
-            <a:r>
-              <a:rPr lang="es-CL" dirty="0" err="1"/>
-              <a:t>Team</a:t>
-            </a:r>
-            <a:endParaRPr lang="es-CL" dirty="0"/>
-          </a:p>
-          <a:p>
-            <a:pPr algn="ctr"/>
-            <a:endParaRPr lang="es-CL" dirty="0"/>
+              <a:rPr lang="en-US" dirty="0"/>
+              <a:t>Development Team</a:t>
+            </a:r>
           </a:p>
           <a:p>
             <a:pPr algn="ctr"/>
@@ -7517,8 +7539,8 @@
         </p:nvSpPr>
         <p:spPr>
           <a:xfrm>
-            <a:off x="8918448" y="4133088"/>
-            <a:ext cx="2212848" cy="923330"/>
+            <a:off x="6332284" y="4899005"/>
+            <a:ext cx="2212848" cy="646331"/>
           </a:xfrm>
           <a:prstGeom prst="rect">
             <a:avLst/>
@@ -7533,22 +7555,9 @@
           <a:p>
             <a:pPr algn="ctr"/>
             <a:r>
-              <a:rPr lang="es-CL" dirty="0" err="1"/>
-              <a:t>Development</a:t>
-            </a:r>
-            <a:r>
-              <a:rPr lang="es-CL" dirty="0"/>
-              <a:t> </a:t>
-            </a:r>
-            <a:r>
-              <a:rPr lang="es-CL" dirty="0" err="1"/>
-              <a:t>Team</a:t>
-            </a:r>
-            <a:endParaRPr lang="es-CL" dirty="0"/>
-          </a:p>
-          <a:p>
-            <a:pPr algn="ctr"/>
-            <a:endParaRPr lang="es-CL" dirty="0"/>
+              <a:rPr lang="en-US" dirty="0"/>
+              <a:t>Development Team</a:t>
+            </a:r>
           </a:p>
           <a:p>
             <a:pPr algn="ctr"/>
@@ -7591,44 +7600,10 @@
       </p:grpSpPr>
       <p:sp>
         <p:nvSpPr>
-          <p:cNvPr id="2" name="Título 1">
+          <p:cNvPr id="5" name="Elipse 4">
             <a:extLst>
               <a:ext uri="{FF2B5EF4-FFF2-40B4-BE49-F238E27FC236}">
-                <a16:creationId xmlns:a16="http://schemas.microsoft.com/office/drawing/2014/main" id="{4F776BD3-50C6-9630-7ED6-AA837CBA15D5}"/>
-              </a:ext>
-            </a:extLst>
-          </p:cNvPr>
-          <p:cNvSpPr>
-            <a:spLocks noGrp="1"/>
-          </p:cNvSpPr>
-          <p:nvPr>
-            <p:ph type="title"/>
-          </p:nvPr>
-        </p:nvSpPr>
-        <p:spPr>
-          <a:xfrm>
-            <a:off x="434662" y="507454"/>
-            <a:ext cx="2990087" cy="668176"/>
-          </a:xfrm>
-        </p:spPr>
-        <p:txBody>
-          <a:bodyPr/>
-          <a:lstStyle/>
-          <a:p>
-            <a:pPr algn="ctr"/>
-            <a:r>
-              <a:rPr lang="es-CL" b="1" dirty="0"/>
-              <a:t>evidencias</a:t>
-            </a:r>
-          </a:p>
-        </p:txBody>
-      </p:sp>
-      <p:sp>
-        <p:nvSpPr>
-          <p:cNvPr id="4" name="Elipse 3">
-            <a:extLst>
-              <a:ext uri="{FF2B5EF4-FFF2-40B4-BE49-F238E27FC236}">
-                <a16:creationId xmlns:a16="http://schemas.microsoft.com/office/drawing/2014/main" id="{02CF837A-9502-36F0-CFEF-9C83DD9F9CAC}"/>
+                <a16:creationId xmlns:a16="http://schemas.microsoft.com/office/drawing/2014/main" id="{849FC11D-3819-DB10-1340-91E4127BFA90}"/>
               </a:ext>
             </a:extLst>
           </p:cNvPr>
@@ -7637,7 +7612,7 @@
         </p:nvSpPr>
         <p:spPr>
           <a:xfrm>
-            <a:off x="1780311" y="1892065"/>
+            <a:off x="770541" y="1138066"/>
             <a:ext cx="2318327" cy="997528"/>
           </a:xfrm>
           <a:prstGeom prst="ellipse">
@@ -7679,23 +7654,7 @@
                 <a:latin typeface="Calibri" panose="020F0502020204030204" pitchFamily="34" charset="0"/>
                 <a:ea typeface="Calibri" panose="020F0502020204030204" pitchFamily="34" charset="0"/>
               </a:rPr>
-              <a:t>Minuta </a:t>
-            </a:r>
-            <a:r>
-              <a:rPr lang="es-CL" sz="1800" dirty="0" err="1">
-                <a:effectLst/>
-                <a:latin typeface="Calibri" panose="020F0502020204030204" pitchFamily="34" charset="0"/>
-                <a:ea typeface="Calibri" panose="020F0502020204030204" pitchFamily="34" charset="0"/>
-              </a:rPr>
-              <a:t>Kick</a:t>
-            </a:r>
-            <a:r>
-              <a:rPr lang="es-CL" sz="1800" dirty="0">
-                <a:effectLst/>
-                <a:latin typeface="Calibri" panose="020F0502020204030204" pitchFamily="34" charset="0"/>
-                <a:ea typeface="Calibri" panose="020F0502020204030204" pitchFamily="34" charset="0"/>
-              </a:rPr>
-              <a:t> Off</a:t>
+              <a:t>Definición del Proyecto ATP</a:t>
             </a:r>
             <a:endParaRPr lang="es-CL" dirty="0"/>
           </a:p>
@@ -7703,10 +7662,44 @@
       </p:sp>
       <p:sp>
         <p:nvSpPr>
-          <p:cNvPr id="5" name="Elipse 4">
+          <p:cNvPr id="2" name="Título 1">
             <a:extLst>
               <a:ext uri="{FF2B5EF4-FFF2-40B4-BE49-F238E27FC236}">
-                <a16:creationId xmlns:a16="http://schemas.microsoft.com/office/drawing/2014/main" id="{849FC11D-3819-DB10-1340-91E4127BFA90}"/>
+                <a16:creationId xmlns:a16="http://schemas.microsoft.com/office/drawing/2014/main" id="{4F776BD3-50C6-9630-7ED6-AA837CBA15D5}"/>
+              </a:ext>
+            </a:extLst>
+          </p:cNvPr>
+          <p:cNvSpPr>
+            <a:spLocks noGrp="1"/>
+          </p:cNvSpPr>
+          <p:nvPr>
+            <p:ph type="title"/>
+          </p:nvPr>
+        </p:nvSpPr>
+        <p:spPr>
+          <a:xfrm>
+            <a:off x="434658" y="223662"/>
+            <a:ext cx="2990087" cy="668176"/>
+          </a:xfrm>
+        </p:spPr>
+        <p:txBody>
+          <a:bodyPr/>
+          <a:lstStyle/>
+          <a:p>
+            <a:pPr algn="ctr"/>
+            <a:r>
+              <a:rPr lang="es-CL" b="1" dirty="0"/>
+              <a:t>evidencias</a:t>
+            </a:r>
+          </a:p>
+        </p:txBody>
+      </p:sp>
+      <p:sp>
+        <p:nvSpPr>
+          <p:cNvPr id="4" name="Elipse 3">
+            <a:extLst>
+              <a:ext uri="{FF2B5EF4-FFF2-40B4-BE49-F238E27FC236}">
+                <a16:creationId xmlns:a16="http://schemas.microsoft.com/office/drawing/2014/main" id="{02CF837A-9502-36F0-CFEF-9C83DD9F9CAC}"/>
               </a:ext>
             </a:extLst>
           </p:cNvPr>
@@ -7715,7 +7708,7 @@
         </p:nvSpPr>
         <p:spPr>
           <a:xfrm>
-            <a:off x="5054506" y="676866"/>
+            <a:off x="770540" y="2290925"/>
             <a:ext cx="2318327" cy="997528"/>
           </a:xfrm>
           <a:prstGeom prst="ellipse">
@@ -7757,7 +7750,23 @@
                 <a:latin typeface="Calibri" panose="020F0502020204030204" pitchFamily="34" charset="0"/>
                 <a:ea typeface="Calibri" panose="020F0502020204030204" pitchFamily="34" charset="0"/>
               </a:rPr>
-              <a:t>Definición del Proyecto ATP</a:t>
+              <a:t>Minuta </a:t>
+            </a:r>
+            <a:r>
+              <a:rPr lang="en-US" sz="1800" dirty="0">
+                <a:effectLst/>
+                <a:latin typeface="Calibri" panose="020F0502020204030204" pitchFamily="34" charset="0"/>
+                <a:ea typeface="Calibri" panose="020F0502020204030204" pitchFamily="34" charset="0"/>
+              </a:rPr>
+              <a:t>Kick</a:t>
+            </a:r>
+            <a:r>
+              <a:rPr lang="es-CL" sz="1800" dirty="0">
+                <a:effectLst/>
+                <a:latin typeface="Calibri" panose="020F0502020204030204" pitchFamily="34" charset="0"/>
+                <a:ea typeface="Calibri" panose="020F0502020204030204" pitchFamily="34" charset="0"/>
+              </a:rPr>
+              <a:t> Off</a:t>
             </a:r>
             <a:endParaRPr lang="es-CL" dirty="0"/>
           </a:p>
@@ -7777,8 +7786,8 @@
         </p:nvSpPr>
         <p:spPr>
           <a:xfrm>
-            <a:off x="1700784" y="3211484"/>
-            <a:ext cx="2397854" cy="1151467"/>
+            <a:off x="3270520" y="3443784"/>
+            <a:ext cx="2431142" cy="997529"/>
           </a:xfrm>
           <a:prstGeom prst="ellipse">
             <a:avLst/>
@@ -7839,7 +7848,7 @@
         </p:nvSpPr>
         <p:spPr>
           <a:xfrm>
-            <a:off x="1769764" y="4684842"/>
+            <a:off x="3326926" y="5636810"/>
             <a:ext cx="2318327" cy="997528"/>
           </a:xfrm>
           <a:prstGeom prst="ellipse">
@@ -7901,7 +7910,7 @@
         </p:nvSpPr>
         <p:spPr>
           <a:xfrm>
-            <a:off x="7139982" y="3211484"/>
+            <a:off x="770539" y="5636810"/>
             <a:ext cx="2318327" cy="997528"/>
           </a:xfrm>
           <a:prstGeom prst="ellipse">
@@ -7963,7 +7972,7 @@
         </p:nvSpPr>
         <p:spPr>
           <a:xfrm>
-            <a:off x="4460147" y="3211484"/>
+            <a:off x="3326929" y="1138066"/>
             <a:ext cx="2318327" cy="997528"/>
           </a:xfrm>
           <a:prstGeom prst="ellipse">
@@ -8025,7 +8034,7 @@
         </p:nvSpPr>
         <p:spPr>
           <a:xfrm>
-            <a:off x="4460147" y="1835482"/>
+            <a:off x="770539" y="3406220"/>
             <a:ext cx="2318327" cy="997528"/>
           </a:xfrm>
           <a:prstGeom prst="ellipse">
@@ -8087,7 +8096,7 @@
         </p:nvSpPr>
         <p:spPr>
           <a:xfrm>
-            <a:off x="9252525" y="1559192"/>
+            <a:off x="770539" y="4521515"/>
             <a:ext cx="2318327" cy="997528"/>
           </a:xfrm>
           <a:prstGeom prst="ellipse">
@@ -8149,7 +8158,7 @@
         </p:nvSpPr>
         <p:spPr>
           <a:xfrm>
-            <a:off x="7150530" y="4587486"/>
+            <a:off x="3326928" y="2290925"/>
             <a:ext cx="2318327" cy="997528"/>
           </a:xfrm>
           <a:prstGeom prst="ellipse">
@@ -8186,22 +8195,14 @@
           <a:p>
             <a:pPr algn="ctr"/>
             <a:r>
-              <a:rPr lang="es-CL" sz="1800" dirty="0" err="1">
+              <a:rPr lang="en-US" sz="1800" dirty="0">
                 <a:effectLst/>
                 <a:latin typeface="Calibri" panose="020F0502020204030204" pitchFamily="34" charset="0"/>
                 <a:ea typeface="Calibri" panose="020F0502020204030204" pitchFamily="34" charset="0"/>
               </a:rPr>
-              <a:t>Product</a:t>
-            </a:r>
-            <a:r>
-              <a:rPr lang="es-CL" sz="1800" dirty="0">
-                <a:effectLst/>
-                <a:latin typeface="Calibri" panose="020F0502020204030204" pitchFamily="34" charset="0"/>
-                <a:ea typeface="Calibri" panose="020F0502020204030204" pitchFamily="34" charset="0"/>
-              </a:rPr>
-              <a:t> Backlog</a:t>
-            </a:r>
-            <a:endParaRPr lang="es-CL" dirty="0"/>
+              <a:t>Product Backlog</a:t>
+            </a:r>
+            <a:endParaRPr lang="en-US" dirty="0"/>
           </a:p>
         </p:txBody>
       </p:sp>
@@ -8219,7 +8220,7 @@
         </p:nvSpPr>
         <p:spPr>
           <a:xfrm>
-            <a:off x="4460147" y="4587486"/>
+            <a:off x="3326925" y="4540297"/>
             <a:ext cx="2318327" cy="997528"/>
           </a:xfrm>
           <a:prstGeom prst="ellipse">
@@ -8281,7 +8282,7 @@
         </p:nvSpPr>
         <p:spPr>
           <a:xfrm>
-            <a:off x="9716946" y="3211484"/>
+            <a:off x="6739810" y="1237170"/>
             <a:ext cx="2318327" cy="997528"/>
           </a:xfrm>
           <a:prstGeom prst="ellipse">
@@ -8318,12 +8319,434 @@
           <a:p>
             <a:pPr algn="ctr"/>
             <a:r>
+              <a:rPr lang="en-US" sz="1800" dirty="0">
+                <a:effectLst/>
+                <a:latin typeface="Calibri" panose="020F0502020204030204" pitchFamily="34" charset="0"/>
+                <a:ea typeface="Calibri" panose="020F0502020204030204" pitchFamily="34" charset="0"/>
+              </a:rPr>
+              <a:t>Sprint planning</a:t>
+            </a:r>
+          </a:p>
+        </p:txBody>
+      </p:sp>
+      <p:sp>
+        <p:nvSpPr>
+          <p:cNvPr id="13" name="Título 1">
+            <a:extLst>
+              <a:ext uri="{FF2B5EF4-FFF2-40B4-BE49-F238E27FC236}">
+                <a16:creationId xmlns:a16="http://schemas.microsoft.com/office/drawing/2014/main" id="{5BCF51B6-EE91-731C-88E4-489F82B0578C}"/>
+              </a:ext>
+            </a:extLst>
+          </p:cNvPr>
+          <p:cNvSpPr txBox="1">
+            <a:spLocks/>
+          </p:cNvSpPr>
+          <p:nvPr/>
+        </p:nvSpPr>
+        <p:spPr>
+          <a:xfrm>
+            <a:off x="6967729" y="223662"/>
+            <a:ext cx="4581144" cy="668176"/>
+          </a:xfrm>
+          <a:prstGeom prst="rect">
+            <a:avLst/>
+          </a:prstGeom>
+          <a:effectLst/>
+        </p:spPr>
+        <p:txBody>
+          <a:bodyPr vert="horz" lIns="91440" tIns="45720" rIns="91440" bIns="45720" rtlCol="0" anchor="ctr">
+            <a:normAutofit/>
+          </a:bodyPr>
+          <a:lstStyle>
+            <a:lvl1pPr algn="l" defTabSz="457200" rtl="0" eaLnBrk="1" latinLnBrk="0" hangingPunct="1">
+              <a:spcBef>
+                <a:spcPct val="0"/>
+              </a:spcBef>
+              <a:buNone/>
+              <a:defRPr sz="3600" kern="1200" cap="all">
+                <a:ln w="3175" cmpd="sng">
+                  <a:noFill/>
+                </a:ln>
+                <a:solidFill>
+                  <a:schemeClr val="tx1"/>
+                </a:solidFill>
+                <a:effectLst/>
+                <a:latin typeface="+mj-lt"/>
+                <a:ea typeface="+mj-ea"/>
+                <a:cs typeface="+mj-cs"/>
+              </a:defRPr>
+            </a:lvl1pPr>
+            <a:lvl2pPr eaLnBrk="1" hangingPunct="1">
+              <a:defRPr>
+                <a:solidFill>
+                  <a:schemeClr val="tx2"/>
+                </a:solidFill>
+              </a:defRPr>
+            </a:lvl2pPr>
+            <a:lvl3pPr eaLnBrk="1" hangingPunct="1">
+              <a:defRPr>
+                <a:solidFill>
+                  <a:schemeClr val="tx2"/>
+                </a:solidFill>
+              </a:defRPr>
+            </a:lvl3pPr>
+            <a:lvl4pPr eaLnBrk="1" hangingPunct="1">
+              <a:defRPr>
+                <a:solidFill>
+                  <a:schemeClr val="tx2"/>
+                </a:solidFill>
+              </a:defRPr>
+            </a:lvl4pPr>
+            <a:lvl5pPr eaLnBrk="1" hangingPunct="1">
+              <a:defRPr>
+                <a:solidFill>
+                  <a:schemeClr val="tx2"/>
+                </a:solidFill>
+              </a:defRPr>
+            </a:lvl5pPr>
+            <a:lvl6pPr eaLnBrk="1" hangingPunct="1">
+              <a:defRPr>
+                <a:solidFill>
+                  <a:schemeClr val="tx2"/>
+                </a:solidFill>
+              </a:defRPr>
+            </a:lvl6pPr>
+            <a:lvl7pPr eaLnBrk="1" hangingPunct="1">
+              <a:defRPr>
+                <a:solidFill>
+                  <a:schemeClr val="tx2"/>
+                </a:solidFill>
+              </a:defRPr>
+            </a:lvl7pPr>
+            <a:lvl8pPr eaLnBrk="1" hangingPunct="1">
+              <a:defRPr>
+                <a:solidFill>
+                  <a:schemeClr val="tx2"/>
+                </a:solidFill>
+              </a:defRPr>
+            </a:lvl8pPr>
+            <a:lvl9pPr eaLnBrk="1" hangingPunct="1">
+              <a:defRPr>
+                <a:solidFill>
+                  <a:schemeClr val="tx2"/>
+                </a:solidFill>
+              </a:defRPr>
+            </a:lvl9pPr>
+          </a:lstStyle>
+          <a:p>
+            <a:pPr algn="ctr"/>
+            <a:r>
+              <a:rPr lang="es-CL" sz="3500" b="1" dirty="0"/>
+              <a:t>Evidencias por sprint</a:t>
+            </a:r>
+          </a:p>
+        </p:txBody>
+      </p:sp>
+      <p:sp>
+        <p:nvSpPr>
+          <p:cNvPr id="14" name="Elipse 13">
+            <a:extLst>
+              <a:ext uri="{FF2B5EF4-FFF2-40B4-BE49-F238E27FC236}">
+                <a16:creationId xmlns:a16="http://schemas.microsoft.com/office/drawing/2014/main" id="{6A61FFF0-EE5C-9056-F6A5-AEE4E038DF4A}"/>
+              </a:ext>
+            </a:extLst>
+          </p:cNvPr>
+          <p:cNvSpPr/>
+          <p:nvPr/>
+        </p:nvSpPr>
+        <p:spPr>
+          <a:xfrm>
+            <a:off x="6784808" y="2446256"/>
+            <a:ext cx="2318327" cy="997528"/>
+          </a:xfrm>
+          <a:prstGeom prst="ellipse">
+            <a:avLst/>
+          </a:prstGeom>
+          <a:ln>
+            <a:solidFill>
+              <a:schemeClr val="accent2">
+                <a:lumMod val="20000"/>
+                <a:lumOff val="80000"/>
+              </a:schemeClr>
+            </a:solidFill>
+          </a:ln>
+        </p:spPr>
+        <p:style>
+          <a:lnRef idx="2">
+            <a:schemeClr val="accent1">
+              <a:shade val="15000"/>
+            </a:schemeClr>
+          </a:lnRef>
+          <a:fillRef idx="1">
+            <a:schemeClr val="accent1"/>
+          </a:fillRef>
+          <a:effectRef idx="0">
+            <a:schemeClr val="accent1"/>
+          </a:effectRef>
+          <a:fontRef idx="minor">
+            <a:schemeClr val="lt1"/>
+          </a:fontRef>
+        </p:style>
+        <p:txBody>
+          <a:bodyPr rtlCol="0" anchor="ctr"/>
+          <a:lstStyle/>
+          <a:p>
+            <a:pPr algn="ctr"/>
+            <a:r>
+              <a:rPr lang="en-US" dirty="0">
+                <a:latin typeface="Calibri" panose="020F0502020204030204" pitchFamily="34" charset="0"/>
+                <a:ea typeface="Calibri" panose="020F0502020204030204" pitchFamily="34" charset="0"/>
+              </a:rPr>
+              <a:t>Burndown Chart</a:t>
+            </a:r>
+            <a:endParaRPr lang="en-US" sz="1800" dirty="0">
+              <a:effectLst/>
+              <a:latin typeface="Calibri" panose="020F0502020204030204" pitchFamily="34" charset="0"/>
+              <a:ea typeface="Calibri" panose="020F0502020204030204" pitchFamily="34" charset="0"/>
+            </a:endParaRPr>
+          </a:p>
+        </p:txBody>
+      </p:sp>
+      <p:sp>
+        <p:nvSpPr>
+          <p:cNvPr id="18" name="Elipse 17">
+            <a:extLst>
+              <a:ext uri="{FF2B5EF4-FFF2-40B4-BE49-F238E27FC236}">
+                <a16:creationId xmlns:a16="http://schemas.microsoft.com/office/drawing/2014/main" id="{FE22A0D4-5F3C-5A36-4378-855A2C5869DD}"/>
+              </a:ext>
+            </a:extLst>
+          </p:cNvPr>
+          <p:cNvSpPr/>
+          <p:nvPr/>
+        </p:nvSpPr>
+        <p:spPr>
+          <a:xfrm>
+            <a:off x="9474868" y="1237705"/>
+            <a:ext cx="2318327" cy="997528"/>
+          </a:xfrm>
+          <a:prstGeom prst="ellipse">
+            <a:avLst/>
+          </a:prstGeom>
+          <a:ln>
+            <a:solidFill>
+              <a:schemeClr val="accent2">
+                <a:lumMod val="20000"/>
+                <a:lumOff val="80000"/>
+              </a:schemeClr>
+            </a:solidFill>
+          </a:ln>
+        </p:spPr>
+        <p:style>
+          <a:lnRef idx="2">
+            <a:schemeClr val="accent1">
+              <a:shade val="15000"/>
+            </a:schemeClr>
+          </a:lnRef>
+          <a:fillRef idx="1">
+            <a:schemeClr val="accent1"/>
+          </a:fillRef>
+          <a:effectRef idx="0">
+            <a:schemeClr val="accent1"/>
+          </a:effectRef>
+          <a:fontRef idx="minor">
+            <a:schemeClr val="lt1"/>
+          </a:fontRef>
+        </p:style>
+        <p:txBody>
+          <a:bodyPr rtlCol="0" anchor="ctr"/>
+          <a:lstStyle/>
+          <a:p>
+            <a:pPr algn="ctr"/>
+            <a:r>
+              <a:rPr lang="en-US" sz="1800" dirty="0">
+                <a:effectLst/>
+                <a:latin typeface="Calibri" panose="020F0502020204030204" pitchFamily="34" charset="0"/>
+                <a:ea typeface="Calibri" panose="020F0502020204030204" pitchFamily="34" charset="0"/>
+              </a:rPr>
+              <a:t>Sprint Review</a:t>
+            </a:r>
+          </a:p>
+        </p:txBody>
+      </p:sp>
+      <p:sp>
+        <p:nvSpPr>
+          <p:cNvPr id="19" name="Elipse 18">
+            <a:extLst>
+              <a:ext uri="{FF2B5EF4-FFF2-40B4-BE49-F238E27FC236}">
+                <a16:creationId xmlns:a16="http://schemas.microsoft.com/office/drawing/2014/main" id="{2639997D-6706-4D95-1A8D-DC765AEB5561}"/>
+              </a:ext>
+            </a:extLst>
+          </p:cNvPr>
+          <p:cNvSpPr/>
+          <p:nvPr/>
+        </p:nvSpPr>
+        <p:spPr>
+          <a:xfrm>
+            <a:off x="9474868" y="2467592"/>
+            <a:ext cx="2318327" cy="997528"/>
+          </a:xfrm>
+          <a:prstGeom prst="ellipse">
+            <a:avLst/>
+          </a:prstGeom>
+          <a:ln>
+            <a:solidFill>
+              <a:schemeClr val="accent2">
+                <a:lumMod val="20000"/>
+                <a:lumOff val="80000"/>
+              </a:schemeClr>
+            </a:solidFill>
+          </a:ln>
+        </p:spPr>
+        <p:style>
+          <a:lnRef idx="2">
+            <a:schemeClr val="accent1">
+              <a:shade val="15000"/>
+            </a:schemeClr>
+          </a:lnRef>
+          <a:fillRef idx="1">
+            <a:schemeClr val="accent1"/>
+          </a:fillRef>
+          <a:effectRef idx="0">
+            <a:schemeClr val="accent1"/>
+          </a:effectRef>
+          <a:fontRef idx="minor">
+            <a:schemeClr val="lt1"/>
+          </a:fontRef>
+        </p:style>
+        <p:txBody>
+          <a:bodyPr rtlCol="0" anchor="ctr"/>
+          <a:lstStyle/>
+          <a:p>
+            <a:pPr algn="ctr"/>
+            <a:r>
+              <a:rPr lang="en-US" sz="1800" dirty="0">
+                <a:effectLst/>
+                <a:latin typeface="Calibri" panose="020F0502020204030204" pitchFamily="34" charset="0"/>
+                <a:ea typeface="Calibri" panose="020F0502020204030204" pitchFamily="34" charset="0"/>
+              </a:rPr>
+              <a:t>Sprint Retrospective</a:t>
+            </a:r>
+          </a:p>
+        </p:txBody>
+      </p:sp>
+      <p:sp>
+        <p:nvSpPr>
+          <p:cNvPr id="20" name="Elipse 19">
+            <a:extLst>
+              <a:ext uri="{FF2B5EF4-FFF2-40B4-BE49-F238E27FC236}">
+                <a16:creationId xmlns:a16="http://schemas.microsoft.com/office/drawing/2014/main" id="{E192DB18-F7FB-07F0-4D7F-7B8750584A6C}"/>
+              </a:ext>
+            </a:extLst>
+          </p:cNvPr>
+          <p:cNvSpPr/>
+          <p:nvPr/>
+        </p:nvSpPr>
+        <p:spPr>
+          <a:xfrm>
+            <a:off x="6728399" y="3815231"/>
+            <a:ext cx="2318327" cy="997528"/>
+          </a:xfrm>
+          <a:prstGeom prst="ellipse">
+            <a:avLst/>
+          </a:prstGeom>
+          <a:ln>
+            <a:solidFill>
+              <a:schemeClr val="accent2">
+                <a:lumMod val="20000"/>
+                <a:lumOff val="80000"/>
+              </a:schemeClr>
+            </a:solidFill>
+          </a:ln>
+        </p:spPr>
+        <p:style>
+          <a:lnRef idx="2">
+            <a:schemeClr val="accent1">
+              <a:shade val="15000"/>
+            </a:schemeClr>
+          </a:lnRef>
+          <a:fillRef idx="1">
+            <a:schemeClr val="accent1"/>
+          </a:fillRef>
+          <a:effectRef idx="0">
+            <a:schemeClr val="accent1"/>
+          </a:effectRef>
+          <a:fontRef idx="minor">
+            <a:schemeClr val="lt1"/>
+          </a:fontRef>
+        </p:style>
+        <p:txBody>
+          <a:bodyPr rtlCol="0" anchor="ctr"/>
+          <a:lstStyle/>
+          <a:p>
+            <a:pPr algn="ctr"/>
+            <a:r>
               <a:rPr lang="es-CL" sz="1800" dirty="0">
                 <a:effectLst/>
                 <a:latin typeface="Calibri" panose="020F0502020204030204" pitchFamily="34" charset="0"/>
                 <a:ea typeface="Calibri" panose="020F0502020204030204" pitchFamily="34" charset="0"/>
               </a:rPr>
-              <a:t>Sprint</a:t>
+              <a:t>Meetings</a:t>
+            </a:r>
+          </a:p>
+        </p:txBody>
+      </p:sp>
+      <p:sp>
+        <p:nvSpPr>
+          <p:cNvPr id="21" name="Elipse 20">
+            <a:extLst>
+              <a:ext uri="{FF2B5EF4-FFF2-40B4-BE49-F238E27FC236}">
+                <a16:creationId xmlns:a16="http://schemas.microsoft.com/office/drawing/2014/main" id="{AC65516F-865E-1A66-EA91-08EA504A8561}"/>
+              </a:ext>
+            </a:extLst>
+          </p:cNvPr>
+          <p:cNvSpPr/>
+          <p:nvPr/>
+        </p:nvSpPr>
+        <p:spPr>
+          <a:xfrm>
+            <a:off x="9474867" y="3815231"/>
+            <a:ext cx="2318327" cy="997528"/>
+          </a:xfrm>
+          <a:prstGeom prst="ellipse">
+            <a:avLst/>
+          </a:prstGeom>
+          <a:ln>
+            <a:solidFill>
+              <a:schemeClr val="accent2">
+                <a:lumMod val="20000"/>
+                <a:lumOff val="80000"/>
+              </a:schemeClr>
+            </a:solidFill>
+          </a:ln>
+        </p:spPr>
+        <p:style>
+          <a:lnRef idx="2">
+            <a:schemeClr val="accent1">
+              <a:shade val="15000"/>
+            </a:schemeClr>
+          </a:lnRef>
+          <a:fillRef idx="1">
+            <a:schemeClr val="accent1"/>
+          </a:fillRef>
+          <a:effectRef idx="0">
+            <a:schemeClr val="accent1"/>
+          </a:effectRef>
+          <a:fontRef idx="minor">
+            <a:schemeClr val="lt1"/>
+          </a:fontRef>
+        </p:style>
+        <p:txBody>
+          <a:bodyPr rtlCol="0" anchor="ctr"/>
+          <a:lstStyle/>
+          <a:p>
+            <a:pPr algn="ctr"/>
+            <a:r>
+              <a:rPr lang="es-CL" sz="1800" dirty="0">
+                <a:effectLst/>
+                <a:latin typeface="Calibri" panose="020F0502020204030204" pitchFamily="34" charset="0"/>
+                <a:ea typeface="Calibri" panose="020F0502020204030204" pitchFamily="34" charset="0"/>
+              </a:rPr>
+              <a:t>Sprint Backlog</a:t>
             </a:r>
           </a:p>
         </p:txBody>
@@ -8332,6 +8755,64 @@
     <p:extLst>
       <p:ext uri="{BB962C8B-B14F-4D97-AF65-F5344CB8AC3E}">
         <p14:creationId xmlns:p14="http://schemas.microsoft.com/office/powerpoint/2010/main" val="271385085"/>
+      </p:ext>
+    </p:extLst>
+  </p:cSld>
+  <p:clrMapOvr>
+    <a:masterClrMapping/>
+  </p:clrMapOvr>
+</p:sld>
+</file>
+
+<file path=ppt/slides/slide9.xml><?xml version="1.0" encoding="utf-8"?>
+<p:sld xmlns:a="http://schemas.openxmlformats.org/drawingml/2006/main" xmlns:r="http://schemas.openxmlformats.org/officeDocument/2006/relationships" xmlns:p="http://schemas.openxmlformats.org/presentationml/2006/main">
+  <p:cSld>
+    <p:spTree>
+      <p:nvGrpSpPr>
+        <p:cNvPr id="1" name=""/>
+        <p:cNvGrpSpPr/>
+        <p:nvPr/>
+      </p:nvGrpSpPr>
+      <p:grpSpPr>
+        <a:xfrm>
+          <a:off x="0" y="0"/>
+          <a:ext cx="0" cy="0"/>
+          <a:chOff x="0" y="0"/>
+          <a:chExt cx="0" cy="0"/>
+        </a:xfrm>
+      </p:grpSpPr>
+      <p:sp>
+        <p:nvSpPr>
+          <p:cNvPr id="2" name="Título 1">
+            <a:extLst>
+              <a:ext uri="{FF2B5EF4-FFF2-40B4-BE49-F238E27FC236}">
+                <a16:creationId xmlns:a16="http://schemas.microsoft.com/office/drawing/2014/main" id="{39A93B25-DCD6-8E48-BC32-E655F633E5EC}"/>
+              </a:ext>
+            </a:extLst>
+          </p:cNvPr>
+          <p:cNvSpPr>
+            <a:spLocks noGrp="1"/>
+          </p:cNvSpPr>
+          <p:nvPr>
+            <p:ph type="title"/>
+          </p:nvPr>
+        </p:nvSpPr>
+        <p:spPr/>
+        <p:txBody>
+          <a:bodyPr/>
+          <a:lstStyle/>
+          <a:p>
+            <a:r>
+              <a:rPr lang="es-CL" b="1" dirty="0"/>
+              <a:t>Épicas</a:t>
+            </a:r>
+          </a:p>
+        </p:txBody>
+      </p:sp>
+    </p:spTree>
+    <p:extLst>
+      <p:ext uri="{BB962C8B-B14F-4D97-AF65-F5344CB8AC3E}">
+        <p14:creationId xmlns:p14="http://schemas.microsoft.com/office/powerpoint/2010/main" val="1465258535"/>
       </p:ext>
     </p:extLst>
   </p:cSld>
@@ -8597,15 +9078,6 @@
 </file>
 
 <file path=customXml/item2.xml><?xml version="1.0" encoding="utf-8"?>
-<?mso-contentType ?>
-<FormTemplates xmlns="http://schemas.microsoft.com/sharepoint/v3/contenttype/forms">
-  <Display>DocumentLibraryForm</Display>
-  <Edit>DocumentLibraryForm</Edit>
-  <New>DocumentLibraryForm</New>
-</FormTemplates>
-</file>
-
-<file path=customXml/item3.xml><?xml version="1.0" encoding="utf-8"?>
 <ct:contentTypeSchema xmlns:ct="http://schemas.microsoft.com/office/2006/metadata/contentType" xmlns:ma="http://schemas.microsoft.com/office/2006/metadata/properties/metaAttributes" ct:_="" ma:_="" ma:contentTypeName="Documento" ma:contentTypeID="0x0101006D3C025EB336C54D99738ABA69770699" ma:contentTypeVersion="13" ma:contentTypeDescription="Crear nuevo documento." ma:contentTypeScope="" ma:versionID="70090f480e9bfd9b6622b039184045fa">
   <xsd:schema xmlns:xsd="http://www.w3.org/2001/XMLSchema" xmlns:xs="http://www.w3.org/2001/XMLSchema" xmlns:p="http://schemas.microsoft.com/office/2006/metadata/properties" xmlns:ns3="47801498-949b-4454-8258-23c305d4a262" targetNamespace="http://schemas.microsoft.com/office/2006/metadata/properties" ma:root="true" ma:fieldsID="64121c347dfb86466853bfd46c1f1763" ns3:_="">
     <xsd:import namespace="47801498-949b-4454-8258-23c305d4a262"/>
@@ -8807,6 +9279,15 @@
 </ct:contentTypeSchema>
 </file>
 
+<file path=customXml/item3.xml><?xml version="1.0" encoding="utf-8"?>
+<?mso-contentType ?>
+<FormTemplates xmlns="http://schemas.microsoft.com/sharepoint/v3/contenttype/forms">
+  <Display>DocumentLibraryForm</Display>
+  <Edit>DocumentLibraryForm</Edit>
+  <New>DocumentLibraryForm</New>
+</FormTemplates>
+</file>
+
 <file path=customXml/itemProps1.xml><?xml version="1.0" encoding="utf-8"?>
 <ds:datastoreItem xmlns:ds="http://schemas.openxmlformats.org/officeDocument/2006/customXml" ds:itemID="{FCC9C8BC-E775-462C-B8EF-31E3AFCDF40E}">
   <ds:schemaRefs>
@@ -8824,14 +9305,6 @@
 </file>
 
 <file path=customXml/itemProps2.xml><?xml version="1.0" encoding="utf-8"?>
-<ds:datastoreItem xmlns:ds="http://schemas.openxmlformats.org/officeDocument/2006/customXml" ds:itemID="{77D27035-3B9B-4C54-A982-E0B665C55024}">
-  <ds:schemaRefs>
-    <ds:schemaRef ds:uri="http://schemas.microsoft.com/sharepoint/v3/contenttype/forms"/>
-  </ds:schemaRefs>
-</ds:datastoreItem>
-</file>
-
-<file path=customXml/itemProps3.xml><?xml version="1.0" encoding="utf-8"?>
 <ds:datastoreItem xmlns:ds="http://schemas.openxmlformats.org/officeDocument/2006/customXml" ds:itemID="{CF8E1EB6-11DD-4C76-9D1D-A96910C70864}">
   <ds:schemaRefs>
     <ds:schemaRef ds:uri="http://schemas.microsoft.com/office/2006/metadata/contentType"/>
@@ -8847,4 +9320,12 @@
     <ds:schemaRef ds:uri="http://schemas.microsoft.com/internal/obd"/>
   </ds:schemaRefs>
 </ds:datastoreItem>
+</file>
+
+<file path=customXml/itemProps3.xml><?xml version="1.0" encoding="utf-8"?>
+<ds:datastoreItem xmlns:ds="http://schemas.openxmlformats.org/officeDocument/2006/customXml" ds:itemID="{77D27035-3B9B-4C54-A982-E0B665C55024}">
+  <ds:schemaRefs>
+    <ds:schemaRef ds:uri="http://schemas.microsoft.com/sharepoint/v3/contenttype/forms"/>
+  </ds:schemaRefs>
+</ds:datastoreItem>
 </file>
</xml_diff>